<commit_message>
Make GetField as a local operation. NewArrayObject is also a new LocalOperation
</commit_message>
<xml_diff>
--- a/Documentation/Slides_final.pptx
+++ b/Documentation/Slides_final.pptx
@@ -323,12 +323,12 @@
         </c:dLbls>
         <c:gapWidth val="150"/>
         <c:shape val="box"/>
-        <c:axId val="35124736"/>
-        <c:axId val="102999744"/>
+        <c:axId val="44346880"/>
+        <c:axId val="98152960"/>
         <c:axId val="0"/>
       </c:bar3DChart>
       <c:catAx>
-        <c:axId val="35124736"/>
+        <c:axId val="44346880"/>
         <c:scaling>
           <c:orientation val="minMax"/>
         </c:scaling>
@@ -345,7 +345,7 @@
             <a:round/>
           </a:ln>
         </c:spPr>
-        <c:crossAx val="102999744"/>
+        <c:crossAx val="98152960"/>
         <c:crosses val="autoZero"/>
         <c:auto val="1"/>
         <c:lblAlgn val="ctr"/>
@@ -353,7 +353,7 @@
         <c:noMultiLvlLbl val="1"/>
       </c:catAx>
       <c:valAx>
-        <c:axId val="102999744"/>
+        <c:axId val="98152960"/>
         <c:scaling>
           <c:orientation val="minMax"/>
         </c:scaling>
@@ -381,7 +381,7 @@
             <a:round/>
           </a:ln>
         </c:spPr>
-        <c:crossAx val="35124736"/>
+        <c:crossAx val="44346880"/>
         <c:crossesAt val="0"/>
         <c:crossBetween val="between"/>
       </c:valAx>
@@ -1678,7 +1678,7 @@
           <a:p>
             <a:fld id="{D7C3A134-F1C3-464B-BF47-54DC2DE08F52}" type="datetimeFigureOut">
               <a:rPr lang="en-US" smtClean="0"/>
-              <a:t>6/20/2014</a:t>
+              <a:t>6/27/2014</a:t>
             </a:fld>
             <a:endParaRPr lang="en-US"/>
           </a:p>
@@ -2367,7 +2367,7 @@
           <a:p>
             <a:fld id="{D7C3A134-F1C3-464B-BF47-54DC2DE08F52}" type="datetimeFigureOut">
               <a:rPr lang="en-US" smtClean="0"/>
-              <a:t>6/20/2014</a:t>
+              <a:t>6/27/2014</a:t>
             </a:fld>
             <a:endParaRPr lang="en-US"/>
           </a:p>
@@ -3944,7 +3944,7 @@
           <a:p>
             <a:fld id="{D7C3A134-F1C3-464B-BF47-54DC2DE08F52}" type="datetimeFigureOut">
               <a:rPr lang="en-US" smtClean="0"/>
-              <a:t>6/20/2014</a:t>
+              <a:t>6/27/2014</a:t>
             </a:fld>
             <a:endParaRPr lang="en-US"/>
           </a:p>
@@ -6853,7 +6853,7 @@
           <a:p>
             <a:fld id="{D7C3A134-F1C3-464B-BF47-54DC2DE08F52}" type="datetimeFigureOut">
               <a:rPr lang="en-US" smtClean="0"/>
-              <a:t>6/20/2014</a:t>
+              <a:t>6/27/2014</a:t>
             </a:fld>
             <a:endParaRPr lang="en-US"/>
           </a:p>
@@ -7922,7 +7922,7 @@
             <a:fld id="{28E80666-FB37-4B36-9149-507F3B0178E3}" type="datetimeFigureOut">
               <a:rPr lang="en-US" smtClean="0"/>
               <a:pPr/>
-              <a:t>6/20/2014</a:t>
+              <a:t>6/27/2014</a:t>
             </a:fld>
             <a:endParaRPr lang="en-US" dirty="0"/>
           </a:p>
@@ -8561,7 +8561,7 @@
             <a:fld id="{28E80666-FB37-4B36-9149-507F3B0178E3}" type="datetimeFigureOut">
               <a:rPr lang="en-US" smtClean="0"/>
               <a:pPr/>
-              <a:t>6/20/2014</a:t>
+              <a:t>6/27/2014</a:t>
             </a:fld>
             <a:endParaRPr lang="en-US" dirty="0"/>
           </a:p>
@@ -9759,19 +9759,19 @@
               <a:rPr lang="en-US" b="1" dirty="0" smtClean="0">
                 <a:latin typeface="Candara"/>
               </a:rPr>
-              <a:t>9 - </a:t>
-            </a:r>
-            <a:r>
-              <a:rPr lang="en-US" b="1" dirty="0" err="1">
-                <a:latin typeface="Candara"/>
-              </a:rPr>
-              <a:t>Purityand</a:t>
+              <a:t>9 </a:t>
+            </a:r>
+            <a:r>
+              <a:rPr lang="en-US" b="1" dirty="0" smtClean="0">
+                <a:latin typeface="Candara"/>
+              </a:rPr>
+              <a:t>– Purity and </a:t>
             </a:r>
             <a:r>
               <a:rPr lang="en-US" b="1" dirty="0">
                 <a:latin typeface="Candara"/>
               </a:rPr>
-              <a:t> Escape analysis</a:t>
+              <a:t>Escape analysis</a:t>
             </a:r>
             <a:endParaRPr b="1" dirty="0"/>
           </a:p>

</xml_diff>

<commit_message>
Updates in codebase and documentation
</commit_message>
<xml_diff>
--- a/Documentation/Slides_final.pptx
+++ b/Documentation/Slides_final.pptx
@@ -152,7 +152,6 @@
           </a:p>
         </c:rich>
       </c:tx>
-      <c:layout/>
       <c:overlay val="1"/>
     </c:title>
     <c:autoTitleDeleted val="0"/>
@@ -323,12 +322,12 @@
         </c:dLbls>
         <c:gapWidth val="150"/>
         <c:shape val="box"/>
-        <c:axId val="44346880"/>
-        <c:axId val="98152960"/>
+        <c:axId val="122469888"/>
+        <c:axId val="99606528"/>
         <c:axId val="0"/>
       </c:bar3DChart>
       <c:catAx>
-        <c:axId val="44346880"/>
+        <c:axId val="122469888"/>
         <c:scaling>
           <c:orientation val="minMax"/>
         </c:scaling>
@@ -345,7 +344,7 @@
             <a:round/>
           </a:ln>
         </c:spPr>
-        <c:crossAx val="98152960"/>
+        <c:crossAx val="99606528"/>
         <c:crosses val="autoZero"/>
         <c:auto val="1"/>
         <c:lblAlgn val="ctr"/>
@@ -353,7 +352,7 @@
         <c:noMultiLvlLbl val="1"/>
       </c:catAx>
       <c:valAx>
-        <c:axId val="98152960"/>
+        <c:axId val="99606528"/>
         <c:scaling>
           <c:orientation val="minMax"/>
         </c:scaling>
@@ -381,7 +380,7 @@
             <a:round/>
           </a:ln>
         </c:spPr>
-        <c:crossAx val="44346880"/>
+        <c:crossAx val="122469888"/>
         <c:crossesAt val="0"/>
         <c:crossBetween val="between"/>
       </c:valAx>
@@ -709,74 +708,79 @@
       </p:grpSpPr>
       <p:sp>
         <p:nvSpPr>
-          <p:cNvPr id="241" name="PlaceHolder 1"/>
+          <p:cNvPr id="2" name="Slide Image Placeholder 1"/>
+          <p:cNvSpPr>
+            <a:spLocks noGrp="1" noRot="1" noChangeAspect="1"/>
+          </p:cNvSpPr>
+          <p:nvPr>
+            <p:ph type="sldImg"/>
+          </p:nvPr>
+        </p:nvSpPr>
+        <p:spPr>
+          <a:xfrm>
+            <a:off x="215900" y="801688"/>
+            <a:ext cx="7127875" cy="4010025"/>
+          </a:xfrm>
+          <a:prstGeom prst="rect">
+            <a:avLst/>
+          </a:prstGeom>
+          <a:noFill/>
+          <a:ln w="12700">
+            <a:solidFill>
+              <a:prstClr val="black"/>
+            </a:solidFill>
+          </a:ln>
+        </p:spPr>
+      </p:sp>
+      <p:sp>
+        <p:nvSpPr>
+          <p:cNvPr id="3" name="Notes Placeholder 2"/>
           <p:cNvSpPr>
             <a:spLocks noGrp="1"/>
           </p:cNvSpPr>
           <p:nvPr>
-            <p:ph type="body"/>
+            <p:ph type="body" idx="1"/>
           </p:nvPr>
         </p:nvSpPr>
-        <p:spPr>
-          <a:xfrm>
-            <a:off x="755640" y="5078520"/>
-            <a:ext cx="6048000" cy="4811400"/>
-          </a:xfrm>
-          <a:prstGeom prst="rect">
-            <a:avLst/>
-          </a:prstGeom>
-        </p:spPr>
+        <p:spPr/>
         <p:txBody>
           <a:bodyPr/>
           <a:lstStyle/>
           <a:p>
-            <a:r>
-              <a:rPr lang="en-US"/>
-              <a:t>Interruptany time</a:t>
-            </a:r>
-            <a:endParaRPr/>
-          </a:p>
-        </p:txBody>
-      </p:sp>
-      <p:sp>
-        <p:nvSpPr>
-          <p:cNvPr id="242" name="TextShape 2"/>
-          <p:cNvSpPr txBox="1"/>
-          <p:nvPr/>
-        </p:nvSpPr>
-        <p:spPr>
-          <a:xfrm>
-            <a:off x="4281480" y="10155240"/>
-            <a:ext cx="3276360" cy="534600"/>
-          </a:xfrm>
-          <a:prstGeom prst="rect">
-            <a:avLst/>
-          </a:prstGeom>
-        </p:spPr>
-        <p:txBody>
-          <a:bodyPr anchor="b"/>
+            <a:endParaRPr lang="en-US"/>
+          </a:p>
+        </p:txBody>
+      </p:sp>
+      <p:sp>
+        <p:nvSpPr>
+          <p:cNvPr id="4" name="Slide Number Placeholder 3"/>
+          <p:cNvSpPr>
+            <a:spLocks noGrp="1"/>
+          </p:cNvSpPr>
+          <p:nvPr>
+            <p:ph type="sldNum" idx="10"/>
+          </p:nvPr>
+        </p:nvSpPr>
+        <p:spPr/>
+        <p:txBody>
+          <a:bodyPr/>
           <a:lstStyle/>
           <a:p>
-            <a:pPr algn="r">
-              <a:lnSpc>
-                <a:spcPct val="100000"/>
-              </a:lnSpc>
-            </a:pPr>
-            <a:fld id="{60E4F0FF-66DD-478B-B1DE-15F352E9585A}" type="slidenum">
-              <a:rPr lang="en-US" sz="1200">
-                <a:solidFill>
-                  <a:srgbClr val="000000"/>
-                </a:solidFill>
-                <a:latin typeface="+mn-lt"/>
-                <a:ea typeface="+mn-ea"/>
-              </a:rPr>
-              <a:t>2</a:t>
+            <a:pPr algn="r"/>
+            <a:fld id="{07893A24-6CBF-49DC-BE29-F65C2F0CED75}" type="slidenum">
+              <a:rPr lang="en-US" smtClean="0"/>
+              <a:t>1</a:t>
             </a:fld>
-            <a:endParaRPr/>
+            <a:endParaRPr lang="en-US"/>
           </a:p>
         </p:txBody>
       </p:sp>
     </p:spTree>
+    <p:extLst>
+      <p:ext uri="{BB962C8B-B14F-4D97-AF65-F5344CB8AC3E}">
+        <p14:creationId xmlns:p14="http://schemas.microsoft.com/office/powerpoint/2010/main" val="3774086295"/>
+      </p:ext>
+    </p:extLst>
   </p:cSld>
   <p:clrMapOvr>
     <a:masterClrMapping/>
@@ -803,7 +807,7 @@
       </p:grpSpPr>
       <p:sp>
         <p:nvSpPr>
-          <p:cNvPr id="243" name="PlaceHolder 1"/>
+          <p:cNvPr id="241" name="PlaceHolder 1"/>
           <p:cNvSpPr>
             <a:spLocks noGrp="1"/>
           </p:cNvSpPr>
@@ -824,66 +828,17 @@
           <a:bodyPr/>
           <a:lstStyle/>
           <a:p>
-            <a:pPr algn="just">
-              <a:lnSpc>
-                <a:spcPct val="100000"/>
-              </a:lnSpc>
-            </a:pPr>
             <a:r>
               <a:rPr lang="en-US"/>
-              <a:t>Java,.Net</a:t>
+              <a:t>Interruptany time</a:t>
             </a:r>
             <a:endParaRPr/>
           </a:p>
-          <a:p>
-            <a:pPr algn="just">
-              <a:lnSpc>
-                <a:spcPct val="100000"/>
-              </a:lnSpc>
-            </a:pPr>
-            <a:r>
-              <a:rPr lang="en-US"/>
-              <a:t>Virtualinstruction set</a:t>
-            </a:r>
-            <a:endParaRPr/>
-          </a:p>
-          <a:p>
-            <a:pPr algn="just">
-              <a:lnSpc>
-                <a:spcPct val="100000"/>
-              </a:lnSpc>
-            </a:pPr>
-            <a:r>
-              <a:rPr lang="en-US"/>
-              <a:t>All math operations and assignments are using an evaluation stack</a:t>
-            </a:r>
-            <a:endParaRPr/>
-          </a:p>
-          <a:p>
-            <a:pPr algn="just">
-              <a:lnSpc>
-                <a:spcPct val="100000"/>
-              </a:lnSpc>
-            </a:pPr>
-            <a:r>
-              <a:rPr lang="en-US"/>
-              <a:t>They are both stack and registerVms(by means of using local variables)</a:t>
-            </a:r>
-            <a:endParaRPr/>
-          </a:p>
-          <a:p>
-            <a:pPr algn="just">
-              <a:lnSpc>
-                <a:spcPct val="100000"/>
-              </a:lnSpc>
-            </a:pPr>
-            <a:endParaRPr/>
-          </a:p>
-        </p:txBody>
-      </p:sp>
-      <p:sp>
-        <p:nvSpPr>
-          <p:cNvPr id="244" name="TextShape 2"/>
+        </p:txBody>
+      </p:sp>
+      <p:sp>
+        <p:nvSpPr>
+          <p:cNvPr id="242" name="TextShape 2"/>
           <p:cNvSpPr txBox="1"/>
           <p:nvPr/>
         </p:nvSpPr>
@@ -905,7 +860,7 @@
                 <a:spcPct val="100000"/>
               </a:lnSpc>
             </a:pPr>
-            <a:fld id="{BA54984B-D746-43C3-A821-C8A41FB26C89}" type="slidenum">
+            <a:fld id="{60E4F0FF-66DD-478B-B1DE-15F352E9585A}" type="slidenum">
               <a:rPr lang="en-US" sz="1200">
                 <a:solidFill>
                   <a:srgbClr val="000000"/>
@@ -913,7 +868,7 @@
                 <a:latin typeface="+mn-lt"/>
                 <a:ea typeface="+mn-ea"/>
               </a:rPr>
-              <a:t>3</a:t>
+              <a:t>2</a:t>
             </a:fld>
             <a:endParaRPr/>
           </a:p>
@@ -946,7 +901,7 @@
       </p:grpSpPr>
       <p:sp>
         <p:nvSpPr>
-          <p:cNvPr id="245" name="PlaceHolder 1"/>
+          <p:cNvPr id="243" name="PlaceHolder 1"/>
           <p:cNvSpPr>
             <a:spLocks noGrp="1"/>
           </p:cNvSpPr>
@@ -967,30 +922,66 @@
           <a:bodyPr/>
           <a:lstStyle/>
           <a:p>
-            <a:pPr>
+            <a:pPr algn="just">
               <a:lnSpc>
                 <a:spcPct val="100000"/>
               </a:lnSpc>
             </a:pPr>
             <a:r>
               <a:rPr lang="en-US"/>
-              <a:t>Read IL→ Interpret → CR IL Code → Optimizations → Optimized CR IL Code → C++ code generation → C++ Code → Compile</a:t>
+              <a:t>Java,.Net</a:t>
             </a:r>
             <a:endParaRPr/>
           </a:p>
           <a:p>
-            <a:pPr>
-              <a:lnSpc>
-                <a:spcPct val="100000"/>
-              </a:lnSpc>
-            </a:pPr>
+            <a:pPr algn="just">
+              <a:lnSpc>
+                <a:spcPct val="100000"/>
+              </a:lnSpc>
+            </a:pPr>
+            <a:r>
+              <a:rPr lang="en-US"/>
+              <a:t>Virtualinstruction set</a:t>
+            </a:r>
             <a:endParaRPr/>
           </a:p>
-        </p:txBody>
-      </p:sp>
-      <p:sp>
-        <p:nvSpPr>
-          <p:cNvPr id="246" name="TextShape 2"/>
+          <a:p>
+            <a:pPr algn="just">
+              <a:lnSpc>
+                <a:spcPct val="100000"/>
+              </a:lnSpc>
+            </a:pPr>
+            <a:r>
+              <a:rPr lang="en-US"/>
+              <a:t>All math operations and assignments are using an evaluation stack</a:t>
+            </a:r>
+            <a:endParaRPr/>
+          </a:p>
+          <a:p>
+            <a:pPr algn="just">
+              <a:lnSpc>
+                <a:spcPct val="100000"/>
+              </a:lnSpc>
+            </a:pPr>
+            <a:r>
+              <a:rPr lang="en-US"/>
+              <a:t>They are both stack and registerVms(by means of using local variables)</a:t>
+            </a:r>
+            <a:endParaRPr/>
+          </a:p>
+          <a:p>
+            <a:pPr algn="just">
+              <a:lnSpc>
+                <a:spcPct val="100000"/>
+              </a:lnSpc>
+            </a:pPr>
+            <a:endParaRPr/>
+          </a:p>
+        </p:txBody>
+      </p:sp>
+      <p:sp>
+        <p:nvSpPr>
+          <p:cNvPr id="244" name="TextShape 2"/>
           <p:cNvSpPr txBox="1"/>
           <p:nvPr/>
         </p:nvSpPr>
@@ -1012,7 +1003,7 @@
                 <a:spcPct val="100000"/>
               </a:lnSpc>
             </a:pPr>
-            <a:fld id="{B7391367-A83E-4B38-99AB-11A1AD8DD97C}" type="slidenum">
+            <a:fld id="{BA54984B-D746-43C3-A821-C8A41FB26C89}" type="slidenum">
               <a:rPr lang="en-US" sz="1200">
                 <a:solidFill>
                   <a:srgbClr val="000000"/>
@@ -1020,7 +1011,7 @@
                 <a:latin typeface="+mn-lt"/>
                 <a:ea typeface="+mn-ea"/>
               </a:rPr>
-              <a:t>4</a:t>
+              <a:t>3</a:t>
             </a:fld>
             <a:endParaRPr/>
           </a:p>
@@ -1053,7 +1044,7 @@
       </p:grpSpPr>
       <p:sp>
         <p:nvSpPr>
-          <p:cNvPr id="247" name="PlaceHolder 1"/>
+          <p:cNvPr id="245" name="PlaceHolder 1"/>
           <p:cNvSpPr>
             <a:spLocks noGrp="1"/>
           </p:cNvSpPr>
@@ -1074,74 +1065,30 @@
           <a:bodyPr/>
           <a:lstStyle/>
           <a:p>
-            <a:pPr algn="just">
+            <a:pPr>
               <a:lnSpc>
                 <a:spcPct val="100000"/>
               </a:lnSpc>
             </a:pPr>
             <a:r>
               <a:rPr lang="en-US"/>
-              <a:t>Looks for input assembly</a:t>
+              <a:t>Read IL→ Interpret → CR IL Code → Optimizations → Optimized CR IL Code → C++ code generation → C++ Code → Compile</a:t>
             </a:r>
             <a:endParaRPr/>
           </a:p>
           <a:p>
-            <a:pPr algn="just">
-              <a:lnSpc>
-                <a:spcPct val="100000"/>
-              </a:lnSpc>
-            </a:pPr>
-            <a:r>
-              <a:rPr lang="en-US"/>
-              <a:t>UsingMono.Reflectionto get IL code</a:t>
-            </a:r>
+            <a:pPr>
+              <a:lnSpc>
+                <a:spcPct val="100000"/>
+              </a:lnSpc>
+            </a:pPr>
             <a:endParaRPr/>
           </a:p>
-          <a:p>
-            <a:pPr algn="just">
-              <a:lnSpc>
-                <a:spcPct val="100000"/>
-              </a:lnSpc>
-            </a:pPr>
-            <a:r>
-              <a:rPr lang="en-US"/>
-              <a:t>Scan for various Call instructions to fill the call-graph</a:t>
-            </a:r>
-            <a:endParaRPr/>
-          </a:p>
-          <a:p>
-            <a:pPr algn="just">
-              <a:lnSpc>
-                <a:spcPct val="100000"/>
-              </a:lnSpc>
-            </a:pPr>
-            <a:r>
-              <a:rPr lang="en-US"/>
-              <a:t>Interpret instructions into CR equivalent in which instructions are grouped by semantics</a:t>
-            </a:r>
-            <a:endParaRPr/>
-          </a:p>
-          <a:p>
-            <a:pPr algn="just">
-              <a:lnSpc>
-                <a:spcPct val="100000"/>
-              </a:lnSpc>
-            </a:pPr>
-            <a:endParaRPr/>
-          </a:p>
-          <a:p>
-            <a:pPr algn="just">
-              <a:lnSpc>
-                <a:spcPct val="100000"/>
-              </a:lnSpc>
-            </a:pPr>
-            <a:endParaRPr/>
-          </a:p>
-        </p:txBody>
-      </p:sp>
-      <p:sp>
-        <p:nvSpPr>
-          <p:cNvPr id="248" name="TextShape 2"/>
+        </p:txBody>
+      </p:sp>
+      <p:sp>
+        <p:nvSpPr>
+          <p:cNvPr id="246" name="TextShape 2"/>
           <p:cNvSpPr txBox="1"/>
           <p:nvPr/>
         </p:nvSpPr>
@@ -1163,7 +1110,7 @@
                 <a:spcPct val="100000"/>
               </a:lnSpc>
             </a:pPr>
-            <a:fld id="{A287CD20-F659-4D1B-8861-1C291EA759E1}" type="slidenum">
+            <a:fld id="{B7391367-A83E-4B38-99AB-11A1AD8DD97C}" type="slidenum">
               <a:rPr lang="en-US" sz="1200">
                 <a:solidFill>
                   <a:srgbClr val="000000"/>
@@ -1171,7 +1118,7 @@
                 <a:latin typeface="+mn-lt"/>
                 <a:ea typeface="+mn-ea"/>
               </a:rPr>
-              <a:t>5</a:t>
+              <a:t>4</a:t>
             </a:fld>
             <a:endParaRPr/>
           </a:p>
@@ -1204,7 +1151,7 @@
       </p:grpSpPr>
       <p:sp>
         <p:nvSpPr>
-          <p:cNvPr id="249" name="PlaceHolder 1"/>
+          <p:cNvPr id="247" name="PlaceHolder 1"/>
           <p:cNvSpPr>
             <a:spLocks noGrp="1"/>
           </p:cNvSpPr>
@@ -1232,7 +1179,7 @@
             </a:pPr>
             <a:r>
               <a:rPr lang="en-US"/>
-              <a:t>Optimizations can be defined by scope:</a:t>
+              <a:t>Looks for input assembly</a:t>
             </a:r>
             <a:endParaRPr/>
           </a:p>
@@ -1244,7 +1191,7 @@
             </a:pPr>
             <a:r>
               <a:rPr lang="en-US"/>
-              <a:t>- one instruction range: various constant evaluations</a:t>
+              <a:t>UsingMono.Reflectionto get IL code</a:t>
             </a:r>
             <a:endParaRPr/>
           </a:p>
@@ -1256,7 +1203,7 @@
             </a:pPr>
             <a:r>
               <a:rPr lang="en-US"/>
-              <a:t>- block based optimizations</a:t>
+              <a:t>Scan for various Call instructions to fill the call-graph</a:t>
             </a:r>
             <a:endParaRPr/>
           </a:p>
@@ -1268,7 +1215,7 @@
             </a:pPr>
             <a:r>
               <a:rPr lang="en-US"/>
-              <a:t>- global (whole function)</a:t>
+              <a:t>Interpret instructions into CR equivalent in which instructions are grouped by semantics</a:t>
             </a:r>
             <a:endParaRPr/>
           </a:p>
@@ -1278,10 +1225,6 @@
                 <a:spcPct val="100000"/>
               </a:lnSpc>
             </a:pPr>
-            <a:r>
-              <a:rPr lang="en-US"/>
-              <a:t>- program wide (in C++: Link time optimizations)</a:t>
-            </a:r>
             <a:endParaRPr/>
           </a:p>
           <a:p>
@@ -1296,7 +1239,7 @@
       </p:sp>
       <p:sp>
         <p:nvSpPr>
-          <p:cNvPr id="250" name="TextShape 2"/>
+          <p:cNvPr id="248" name="TextShape 2"/>
           <p:cNvSpPr txBox="1"/>
           <p:nvPr/>
         </p:nvSpPr>
@@ -1318,7 +1261,7 @@
                 <a:spcPct val="100000"/>
               </a:lnSpc>
             </a:pPr>
-            <a:fld id="{EFBE45EC-B448-4759-BD32-7A54FA65DB36}" type="slidenum">
+            <a:fld id="{A287CD20-F659-4D1B-8861-1C291EA759E1}" type="slidenum">
               <a:rPr lang="en-US" sz="1200">
                 <a:solidFill>
                   <a:srgbClr val="000000"/>
@@ -1326,7 +1269,7 @@
                 <a:latin typeface="+mn-lt"/>
                 <a:ea typeface="+mn-ea"/>
               </a:rPr>
-              <a:t>6</a:t>
+              <a:t>5</a:t>
             </a:fld>
             <a:endParaRPr/>
           </a:p>
@@ -1341,6 +1284,161 @@
 </file>
 
 <file path=ppt/notesSlides/notesSlide6.xml><?xml version="1.0" encoding="utf-8"?>
+<p:notes xmlns:a="http://schemas.openxmlformats.org/drawingml/2006/main" xmlns:r="http://schemas.openxmlformats.org/officeDocument/2006/relationships" xmlns:p="http://schemas.openxmlformats.org/presentationml/2006/main">
+  <p:cSld>
+    <p:spTree>
+      <p:nvGrpSpPr>
+        <p:cNvPr id="1" name=""/>
+        <p:cNvGrpSpPr/>
+        <p:nvPr/>
+      </p:nvGrpSpPr>
+      <p:grpSpPr>
+        <a:xfrm>
+          <a:off x="0" y="0"/>
+          <a:ext cx="0" cy="0"/>
+          <a:chOff x="0" y="0"/>
+          <a:chExt cx="0" cy="0"/>
+        </a:xfrm>
+      </p:grpSpPr>
+      <p:sp>
+        <p:nvSpPr>
+          <p:cNvPr id="249" name="PlaceHolder 1"/>
+          <p:cNvSpPr>
+            <a:spLocks noGrp="1"/>
+          </p:cNvSpPr>
+          <p:nvPr>
+            <p:ph type="body"/>
+          </p:nvPr>
+        </p:nvSpPr>
+        <p:spPr>
+          <a:xfrm>
+            <a:off x="755640" y="5078520"/>
+            <a:ext cx="6048000" cy="4811400"/>
+          </a:xfrm>
+          <a:prstGeom prst="rect">
+            <a:avLst/>
+          </a:prstGeom>
+        </p:spPr>
+        <p:txBody>
+          <a:bodyPr/>
+          <a:lstStyle/>
+          <a:p>
+            <a:pPr algn="just">
+              <a:lnSpc>
+                <a:spcPct val="100000"/>
+              </a:lnSpc>
+            </a:pPr>
+            <a:r>
+              <a:rPr lang="en-US"/>
+              <a:t>Optimizations can be defined by scope:</a:t>
+            </a:r>
+            <a:endParaRPr/>
+          </a:p>
+          <a:p>
+            <a:pPr algn="just">
+              <a:lnSpc>
+                <a:spcPct val="100000"/>
+              </a:lnSpc>
+            </a:pPr>
+            <a:r>
+              <a:rPr lang="en-US"/>
+              <a:t>- one instruction range: various constant evaluations</a:t>
+            </a:r>
+            <a:endParaRPr/>
+          </a:p>
+          <a:p>
+            <a:pPr algn="just">
+              <a:lnSpc>
+                <a:spcPct val="100000"/>
+              </a:lnSpc>
+            </a:pPr>
+            <a:r>
+              <a:rPr lang="en-US"/>
+              <a:t>- block based optimizations</a:t>
+            </a:r>
+            <a:endParaRPr/>
+          </a:p>
+          <a:p>
+            <a:pPr algn="just">
+              <a:lnSpc>
+                <a:spcPct val="100000"/>
+              </a:lnSpc>
+            </a:pPr>
+            <a:r>
+              <a:rPr lang="en-US"/>
+              <a:t>- global (whole function)</a:t>
+            </a:r>
+            <a:endParaRPr/>
+          </a:p>
+          <a:p>
+            <a:pPr algn="just">
+              <a:lnSpc>
+                <a:spcPct val="100000"/>
+              </a:lnSpc>
+            </a:pPr>
+            <a:r>
+              <a:rPr lang="en-US"/>
+              <a:t>- program wide (in C++: Link time optimizations)</a:t>
+            </a:r>
+            <a:endParaRPr/>
+          </a:p>
+          <a:p>
+            <a:pPr algn="just">
+              <a:lnSpc>
+                <a:spcPct val="100000"/>
+              </a:lnSpc>
+            </a:pPr>
+            <a:endParaRPr/>
+          </a:p>
+        </p:txBody>
+      </p:sp>
+      <p:sp>
+        <p:nvSpPr>
+          <p:cNvPr id="250" name="TextShape 2"/>
+          <p:cNvSpPr txBox="1"/>
+          <p:nvPr/>
+        </p:nvSpPr>
+        <p:spPr>
+          <a:xfrm>
+            <a:off x="4281480" y="10155240"/>
+            <a:ext cx="3276360" cy="534600"/>
+          </a:xfrm>
+          <a:prstGeom prst="rect">
+            <a:avLst/>
+          </a:prstGeom>
+        </p:spPr>
+        <p:txBody>
+          <a:bodyPr anchor="b"/>
+          <a:lstStyle/>
+          <a:p>
+            <a:pPr algn="r">
+              <a:lnSpc>
+                <a:spcPct val="100000"/>
+              </a:lnSpc>
+            </a:pPr>
+            <a:fld id="{EFBE45EC-B448-4759-BD32-7A54FA65DB36}" type="slidenum">
+              <a:rPr lang="en-US" sz="1200">
+                <a:solidFill>
+                  <a:srgbClr val="000000"/>
+                </a:solidFill>
+                <a:latin typeface="+mn-lt"/>
+                <a:ea typeface="+mn-ea"/>
+              </a:rPr>
+              <a:t>6</a:t>
+            </a:fld>
+            <a:endParaRPr/>
+          </a:p>
+        </p:txBody>
+      </p:sp>
+    </p:spTree>
+  </p:cSld>
+  <p:clrMapOvr>
+    <a:masterClrMapping/>
+  </p:clrMapOvr>
+</p:notes>
+</file>
+
+<file path=ppt/notesSlides/notesSlide7.xml><?xml version="1.0" encoding="utf-8"?>
 <p:notes xmlns:a="http://schemas.openxmlformats.org/drawingml/2006/main" xmlns:r="http://schemas.openxmlformats.org/officeDocument/2006/relationships" xmlns:p="http://schemas.openxmlformats.org/presentationml/2006/main">
   <p:cSld>
     <p:spTree>
@@ -1678,7 +1776,7 @@
           <a:p>
             <a:fld id="{D7C3A134-F1C3-464B-BF47-54DC2DE08F52}" type="datetimeFigureOut">
               <a:rPr lang="en-US" smtClean="0"/>
-              <a:t>6/27/2014</a:t>
+              <a:t>6/29/2014</a:t>
             </a:fld>
             <a:endParaRPr lang="en-US"/>
           </a:p>
@@ -2367,7 +2465,7 @@
           <a:p>
             <a:fld id="{D7C3A134-F1C3-464B-BF47-54DC2DE08F52}" type="datetimeFigureOut">
               <a:rPr lang="en-US" smtClean="0"/>
-              <a:t>6/27/2014</a:t>
+              <a:t>6/29/2014</a:t>
             </a:fld>
             <a:endParaRPr lang="en-US"/>
           </a:p>
@@ -3944,7 +4042,7 @@
           <a:p>
             <a:fld id="{D7C3A134-F1C3-464B-BF47-54DC2DE08F52}" type="datetimeFigureOut">
               <a:rPr lang="en-US" smtClean="0"/>
-              <a:t>6/27/2014</a:t>
+              <a:t>6/29/2014</a:t>
             </a:fld>
             <a:endParaRPr lang="en-US"/>
           </a:p>
@@ -6853,7 +6951,7 @@
           <a:p>
             <a:fld id="{D7C3A134-F1C3-464B-BF47-54DC2DE08F52}" type="datetimeFigureOut">
               <a:rPr lang="en-US" smtClean="0"/>
-              <a:t>6/27/2014</a:t>
+              <a:t>6/29/2014</a:t>
             </a:fld>
             <a:endParaRPr lang="en-US"/>
           </a:p>
@@ -7922,7 +8020,7 @@
             <a:fld id="{28E80666-FB37-4B36-9149-507F3B0178E3}" type="datetimeFigureOut">
               <a:rPr lang="en-US" smtClean="0"/>
               <a:pPr/>
-              <a:t>6/27/2014</a:t>
+              <a:t>6/29/2014</a:t>
             </a:fld>
             <a:endParaRPr lang="en-US" dirty="0"/>
           </a:p>
@@ -8561,7 +8659,7 @@
             <a:fld id="{28E80666-FB37-4B36-9149-507F3B0178E3}" type="datetimeFigureOut">
               <a:rPr lang="en-US" smtClean="0"/>
               <a:pPr/>
-              <a:t>6/27/2014</a:t>
+              <a:t>6/29/2014</a:t>
             </a:fld>
             <a:endParaRPr lang="en-US" dirty="0"/>
           </a:p>
@@ -9189,7 +9287,7 @@
               <a:t>Compiling and Optimizing </a:t>
             </a:r>
             <a:r>
-              <a:rPr lang="en-US" sz="2800" b="1" dirty="0">
+              <a:rPr lang="en-US" sz="2800" b="1" dirty="0" smtClean="0">
                 <a:solidFill>
                   <a:schemeClr val="tx1">
                     <a:lumMod val="95000"/>
@@ -9197,18 +9295,7 @@
                 </a:solidFill>
                 <a:latin typeface="Candara"/>
               </a:rPr>
-              <a:t>Stack-based </a:t>
-            </a:r>
-            <a:r>
-              <a:rPr lang="en-US" sz="2800" b="1" dirty="0" err="1">
-                <a:solidFill>
-                  <a:schemeClr val="tx1">
-                    <a:lumMod val="95000"/>
-                  </a:schemeClr>
-                </a:solidFill>
-                <a:latin typeface="Candara"/>
-              </a:rPr>
-              <a:t>Vms</a:t>
+              <a:t>Stack-Based VMs</a:t>
             </a:r>
             <a:endParaRPr dirty="0">
               <a:solidFill>
@@ -9759,13 +9846,7 @@
               <a:rPr lang="en-US" b="1" dirty="0" smtClean="0">
                 <a:latin typeface="Candara"/>
               </a:rPr>
-              <a:t>9 </a:t>
-            </a:r>
-            <a:r>
-              <a:rPr lang="en-US" b="1" dirty="0" smtClean="0">
-                <a:latin typeface="Candara"/>
-              </a:rPr>
-              <a:t>– Purity and </a:t>
+              <a:t>9 – Purity and </a:t>
             </a:r>
             <a:r>
               <a:rPr lang="en-US" b="1" dirty="0">
@@ -11260,25 +11341,83 @@
               <a:rPr lang="en-US" sz="2000" dirty="0" smtClean="0">
                 <a:latin typeface="Candara"/>
               </a:rPr>
-              <a:t>1</a:t>
+              <a:t>1 </a:t>
+            </a:r>
+            <a:r>
+              <a:rPr lang="en-US" sz="2000" dirty="0" smtClean="0">
+                <a:latin typeface="Candara"/>
+              </a:rPr>
+              <a:t>– Stack-based </a:t>
+            </a:r>
+            <a:r>
+              <a:rPr lang="en-US" sz="2000" dirty="0" err="1">
+                <a:latin typeface="Candara"/>
+              </a:rPr>
+              <a:t>Vms</a:t>
+            </a:r>
+            <a:endParaRPr sz="2000" dirty="0"/>
+          </a:p>
+          <a:p>
+            <a:pPr>
+              <a:lnSpc>
+                <a:spcPct val="100000"/>
+              </a:lnSpc>
+            </a:pPr>
+            <a:r>
+              <a:rPr lang="en-US" sz="2000" dirty="0" smtClean="0">
+                <a:latin typeface="Candara"/>
+              </a:rPr>
+              <a:t>2 </a:t>
+            </a:r>
+            <a:r>
+              <a:rPr lang="en-US" sz="2000" dirty="0" smtClean="0">
+                <a:latin typeface="Candara"/>
+              </a:rPr>
+              <a:t>– </a:t>
+            </a:r>
+            <a:r>
+              <a:rPr lang="en-US" sz="2000" dirty="0" err="1" smtClean="0">
+                <a:latin typeface="Candara"/>
+              </a:rPr>
+              <a:t>CodeRefractor</a:t>
+            </a:r>
+            <a:r>
+              <a:rPr lang="en-US" sz="2000" dirty="0" smtClean="0">
+                <a:latin typeface="Candara"/>
+              </a:rPr>
+              <a:t> </a:t>
             </a:r>
             <a:r>
               <a:rPr lang="en-US" sz="2000" dirty="0">
                 <a:latin typeface="Candara"/>
               </a:rPr>
-              <a:t>. </a:t>
-            </a:r>
+              <a:t>architecture</a:t>
+            </a:r>
+            <a:endParaRPr sz="2000" dirty="0"/>
+          </a:p>
+          <a:p>
+            <a:pPr>
+              <a:lnSpc>
+                <a:spcPct val="100000"/>
+              </a:lnSpc>
+            </a:pPr>
             <a:r>
               <a:rPr lang="en-US" sz="2000" dirty="0" smtClean="0">
                 <a:latin typeface="Candara"/>
               </a:rPr>
-              <a:t>– Stack-based </a:t>
-            </a:r>
-            <a:r>
-              <a:rPr lang="en-US" sz="2000" dirty="0" err="1">
-                <a:latin typeface="Candara"/>
-              </a:rPr>
-              <a:t>Vms</a:t>
+              <a:t>3 </a:t>
+            </a:r>
+            <a:r>
+              <a:rPr lang="en-US" sz="2000" dirty="0" smtClean="0">
+                <a:latin typeface="Candara"/>
+              </a:rPr>
+              <a:t>– </a:t>
+            </a:r>
+            <a:r>
+              <a:rPr lang="en-US" sz="2000" dirty="0" err="1" smtClean="0">
+                <a:latin typeface="Candara"/>
+              </a:rPr>
+              <a:t>FrontEnd</a:t>
             </a:r>
             <a:endParaRPr sz="2000" dirty="0"/>
           </a:p>
@@ -11292,7 +11431,7 @@
               <a:rPr lang="en-US" sz="2000" dirty="0">
                 <a:latin typeface="Candara"/>
               </a:rPr>
-              <a:t>2. </a:t>
+              <a:t>4 </a:t>
             </a:r>
             <a:r>
               <a:rPr lang="en-US" sz="2000" dirty="0" smtClean="0">
@@ -11301,22 +11440,80 @@
               <a:t>– </a:t>
             </a:r>
             <a:r>
+              <a:rPr lang="en-US" sz="2000" dirty="0" smtClean="0">
+                <a:latin typeface="Candara"/>
+              </a:rPr>
+              <a:t>Optimization </a:t>
+            </a:r>
+            <a:r>
+              <a:rPr lang="en-US" sz="2000" dirty="0">
+                <a:latin typeface="Candara"/>
+              </a:rPr>
+              <a:t>overview</a:t>
+            </a:r>
+            <a:endParaRPr sz="2000" dirty="0"/>
+          </a:p>
+          <a:p>
+            <a:pPr>
+              <a:lnSpc>
+                <a:spcPct val="100000"/>
+              </a:lnSpc>
+            </a:pPr>
+            <a:r>
+              <a:rPr lang="en-US" sz="2000" dirty="0" smtClean="0">
+                <a:latin typeface="Candara"/>
+              </a:rPr>
+              <a:t>5 </a:t>
+            </a:r>
+            <a:r>
+              <a:rPr lang="en-US" sz="2000" dirty="0" smtClean="0">
+                <a:latin typeface="Candara"/>
+              </a:rPr>
+              <a:t>– Local  </a:t>
+            </a:r>
+            <a:r>
+              <a:rPr lang="en-US" sz="2000" dirty="0">
+                <a:latin typeface="Candara"/>
+              </a:rPr>
+              <a:t>Optimizations</a:t>
+            </a:r>
+            <a:endParaRPr sz="2000" dirty="0"/>
+          </a:p>
+          <a:p>
+            <a:pPr>
+              <a:lnSpc>
+                <a:spcPct val="100000"/>
+              </a:lnSpc>
+            </a:pPr>
+            <a:r>
+              <a:rPr lang="en-US" sz="2000" dirty="0" smtClean="0">
+                <a:latin typeface="Candara"/>
+              </a:rPr>
+              <a:t>6 </a:t>
+            </a:r>
+            <a:r>
+              <a:rPr lang="en-US" sz="2000" dirty="0" smtClean="0">
+                <a:latin typeface="Candara"/>
+              </a:rPr>
+              <a:t>– Use-</a:t>
+            </a:r>
+            <a:r>
               <a:rPr lang="en-US" sz="2000" dirty="0" err="1" smtClean="0">
                 <a:latin typeface="Candara"/>
               </a:rPr>
-              <a:t>CodeRefractor</a:t>
+              <a:t>Def</a:t>
             </a:r>
             <a:r>
               <a:rPr lang="en-US" sz="2000" dirty="0" smtClean="0">
                 <a:latin typeface="Candara"/>
               </a:rPr>
-              <a:t> </a:t>
+              <a:t>  </a:t>
             </a:r>
             <a:r>
               <a:rPr lang="en-US" sz="2000" dirty="0">
                 <a:latin typeface="Candara"/>
               </a:rPr>
-              <a:t>architecture</a:t>
+              <a:t>optimizations</a:t>
             </a:r>
             <a:endParaRPr sz="2000" dirty="0"/>
           </a:p>
@@ -11327,114 +11524,10 @@
               </a:lnSpc>
             </a:pPr>
             <a:r>
-              <a:rPr lang="en-US" sz="2000" dirty="0">
-                <a:latin typeface="Candara"/>
-              </a:rPr>
-              <a:t>3. </a:t>
-            </a:r>
-            <a:r>
               <a:rPr lang="en-US" sz="2000" dirty="0" smtClean="0">
                 <a:latin typeface="Candara"/>
               </a:rPr>
-              <a:t>– </a:t>
-            </a:r>
-            <a:r>
-              <a:rPr lang="en-US" sz="2000" dirty="0" err="1" smtClean="0">
-                <a:latin typeface="Candara"/>
-              </a:rPr>
-              <a:t>FrontEnd</a:t>
-            </a:r>
-            <a:endParaRPr sz="2000" dirty="0"/>
-          </a:p>
-          <a:p>
-            <a:pPr>
-              <a:lnSpc>
-                <a:spcPct val="100000"/>
-              </a:lnSpc>
-            </a:pPr>
-            <a:r>
-              <a:rPr lang="en-US" sz="2000" dirty="0">
-                <a:latin typeface="Candara"/>
-              </a:rPr>
-              <a:t>4. - Optimization overview</a:t>
-            </a:r>
-            <a:endParaRPr sz="2000" dirty="0"/>
-          </a:p>
-          <a:p>
-            <a:pPr>
-              <a:lnSpc>
-                <a:spcPct val="100000"/>
-              </a:lnSpc>
-            </a:pPr>
-            <a:r>
-              <a:rPr lang="en-US" sz="2000" dirty="0">
-                <a:latin typeface="Candara"/>
-              </a:rPr>
-              <a:t>5. </a:t>
-            </a:r>
-            <a:r>
-              <a:rPr lang="en-US" sz="2000" dirty="0" smtClean="0">
-                <a:latin typeface="Candara"/>
-              </a:rPr>
-              <a:t>– Local  </a:t>
-            </a:r>
-            <a:r>
-              <a:rPr lang="en-US" sz="2000" dirty="0">
-                <a:latin typeface="Candara"/>
-              </a:rPr>
-              <a:t>Optimizations</a:t>
-            </a:r>
-            <a:endParaRPr sz="2000" dirty="0"/>
-          </a:p>
-          <a:p>
-            <a:pPr>
-              <a:lnSpc>
-                <a:spcPct val="100000"/>
-              </a:lnSpc>
-            </a:pPr>
-            <a:r>
-              <a:rPr lang="en-US" sz="2000" dirty="0">
-                <a:latin typeface="Candara"/>
-              </a:rPr>
-              <a:t>6. </a:t>
-            </a:r>
-            <a:r>
-              <a:rPr lang="en-US" sz="2000" dirty="0" smtClean="0">
-                <a:latin typeface="Candara"/>
-              </a:rPr>
-              <a:t>– Use-</a:t>
-            </a:r>
-            <a:r>
-              <a:rPr lang="en-US" sz="2000" dirty="0" err="1" smtClean="0">
-                <a:latin typeface="Candara"/>
-              </a:rPr>
-              <a:t>Def</a:t>
-            </a:r>
-            <a:r>
-              <a:rPr lang="en-US" sz="2000" dirty="0" smtClean="0">
-                <a:latin typeface="Candara"/>
-              </a:rPr>
-              <a:t>  </a:t>
-            </a:r>
-            <a:r>
-              <a:rPr lang="en-US" sz="2000" dirty="0">
-                <a:latin typeface="Candara"/>
-              </a:rPr>
-              <a:t>optimizations</a:t>
-            </a:r>
-            <a:endParaRPr sz="2000" dirty="0"/>
-          </a:p>
-          <a:p>
-            <a:pPr>
-              <a:lnSpc>
-                <a:spcPct val="100000"/>
-              </a:lnSpc>
-            </a:pPr>
-            <a:r>
-              <a:rPr lang="en-US" sz="2000" dirty="0">
-                <a:latin typeface="Candara"/>
-              </a:rPr>
-              <a:t>7. </a:t>
+              <a:t>7 </a:t>
             </a:r>
             <a:r>
               <a:rPr lang="en-US" sz="2000" dirty="0" smtClean="0">
@@ -11544,7 +11637,13 @@
               <a:rPr lang="en-US" dirty="0">
                 <a:latin typeface="Candara"/>
               </a:rPr>
-              <a:t>1. Performance </a:t>
+              <a:t>1  – </a:t>
+            </a:r>
+            <a:r>
+              <a:rPr lang="en-US" dirty="0" smtClean="0">
+                <a:latin typeface="Candara"/>
+              </a:rPr>
+              <a:t>Performance </a:t>
             </a:r>
             <a:r>
               <a:rPr lang="en-US" dirty="0" err="1">
@@ -11576,7 +11675,19 @@
               <a:rPr lang="en-US" dirty="0">
                 <a:latin typeface="Candara"/>
               </a:rPr>
-              <a:t>2. Questions !?</a:t>
+              <a:t>2 – </a:t>
+            </a:r>
+            <a:r>
+              <a:rPr lang="en-US" dirty="0" smtClean="0">
+                <a:latin typeface="Candara"/>
+              </a:rPr>
+              <a:t>Questions </a:t>
+            </a:r>
+            <a:r>
+              <a:rPr lang="en-US" dirty="0">
+                <a:latin typeface="Candara"/>
+              </a:rPr>
+              <a:t>!?</a:t>
             </a:r>
             <a:endParaRPr dirty="0"/>
           </a:p>

</xml_diff>